<commit_message>
ML foundation Term Project
</commit_message>
<xml_diff>
--- a/projects/PrudentialInsurancePrediction/MLFoundation Project - Insurance risk prediction.pptx
+++ b/projects/PrudentialInsurancePrediction/MLFoundation Project - Insurance risk prediction.pptx
@@ -12,8 +12,15 @@
     <p:sldId id="259" r:id="rId6"/>
     <p:sldId id="260" r:id="rId7"/>
     <p:sldId id="264" r:id="rId8"/>
-    <p:sldId id="261" r:id="rId9"/>
-    <p:sldId id="262" r:id="rId10"/>
+    <p:sldId id="271" r:id="rId9"/>
+    <p:sldId id="261" r:id="rId10"/>
+    <p:sldId id="268" r:id="rId11"/>
+    <p:sldId id="269" r:id="rId12"/>
+    <p:sldId id="262" r:id="rId13"/>
+    <p:sldId id="265" r:id="rId14"/>
+    <p:sldId id="266" r:id="rId15"/>
+    <p:sldId id="267" r:id="rId16"/>
+    <p:sldId id="270" r:id="rId17"/>
   </p:sldIdLst>
   <p:sldSz cx="12192000" cy="6858000"/>
   <p:notesSz cx="6858000" cy="9144000"/>
@@ -112,6 +119,11 @@
       </a:defRPr>
     </a:lvl9pPr>
   </p:defaultTextStyle>
+  <p:extLst>
+    <p:ext uri="{EFAFB233-063F-42B5-8137-9DF3F51BA10A}">
+      <p15:sldGuideLst xmlns:p15="http://schemas.microsoft.com/office/powerpoint/2012/main"/>
+    </p:ext>
+  </p:extLst>
 </p:presentation>
 </file>
 
@@ -345,7 +357,7 @@
             <a:fld id="{B61BEF0D-F0BB-DE4B-95CE-6DB70DBA9567}" type="datetimeFigureOut">
               <a:rPr lang="en-US" dirty="0"/>
               <a:pPr/>
-              <a:t>1/22/20</a:t>
+              <a:t>1/27/20</a:t>
             </a:fld>
             <a:endParaRPr lang="en-US" dirty="0"/>
           </a:p>
@@ -676,7 +688,7 @@
             <a:fld id="{B61BEF0D-F0BB-DE4B-95CE-6DB70DBA9567}" type="datetimeFigureOut">
               <a:rPr lang="en-US" dirty="0"/>
               <a:pPr/>
-              <a:t>1/22/20</a:t>
+              <a:t>1/27/20</a:t>
             </a:fld>
             <a:endParaRPr lang="en-US" dirty="0"/>
           </a:p>
@@ -951,7 +963,7 @@
             <a:fld id="{B61BEF0D-F0BB-DE4B-95CE-6DB70DBA9567}" type="datetimeFigureOut">
               <a:rPr lang="en-US" dirty="0"/>
               <a:pPr/>
-              <a:t>1/22/20</a:t>
+              <a:t>1/27/20</a:t>
             </a:fld>
             <a:endParaRPr lang="en-US" dirty="0"/>
           </a:p>
@@ -1516,7 +1528,7 @@
             <a:fld id="{B61BEF0D-F0BB-DE4B-95CE-6DB70DBA9567}" type="datetimeFigureOut">
               <a:rPr lang="en-US" dirty="0"/>
               <a:pPr/>
-              <a:t>1/22/20</a:t>
+              <a:t>1/27/20</a:t>
             </a:fld>
             <a:endParaRPr lang="en-US" dirty="0"/>
           </a:p>
@@ -1791,7 +1803,7 @@
             <a:fld id="{B61BEF0D-F0BB-DE4B-95CE-6DB70DBA9567}" type="datetimeFigureOut">
               <a:rPr lang="en-US" dirty="0"/>
               <a:pPr/>
-              <a:t>1/22/20</a:t>
+              <a:t>1/27/20</a:t>
             </a:fld>
             <a:endParaRPr lang="en-US" dirty="0"/>
           </a:p>
@@ -2350,7 +2362,7 @@
             <a:fld id="{B61BEF0D-F0BB-DE4B-95CE-6DB70DBA9567}" type="datetimeFigureOut">
               <a:rPr lang="en-US" dirty="0"/>
               <a:pPr/>
-              <a:t>1/22/20</a:t>
+              <a:t>1/27/20</a:t>
             </a:fld>
             <a:endParaRPr lang="en-US" dirty="0"/>
           </a:p>
@@ -2674,7 +2686,7 @@
             <a:fld id="{B61BEF0D-F0BB-DE4B-95CE-6DB70DBA9567}" type="datetimeFigureOut">
               <a:rPr lang="en-US" dirty="0"/>
               <a:pPr/>
-              <a:t>1/22/20</a:t>
+              <a:t>1/27/20</a:t>
             </a:fld>
             <a:endParaRPr lang="en-US" dirty="0"/>
           </a:p>
@@ -2848,7 +2860,7 @@
             <a:fld id="{B61BEF0D-F0BB-DE4B-95CE-6DB70DBA9567}" type="datetimeFigureOut">
               <a:rPr lang="en-US" dirty="0"/>
               <a:pPr/>
-              <a:t>1/22/20</a:t>
+              <a:t>1/27/20</a:t>
             </a:fld>
             <a:endParaRPr lang="en-US" dirty="0"/>
           </a:p>
@@ -3083,7 +3095,7 @@
             <a:fld id="{B61BEF0D-F0BB-DE4B-95CE-6DB70DBA9567}" type="datetimeFigureOut">
               <a:rPr lang="en-US" dirty="0"/>
               <a:pPr/>
-              <a:t>1/22/20</a:t>
+              <a:t>1/27/20</a:t>
             </a:fld>
             <a:endParaRPr lang="en-US" dirty="0"/>
           </a:p>
@@ -3280,7 +3292,7 @@
             <a:fld id="{B61BEF0D-F0BB-DE4B-95CE-6DB70DBA9567}" type="datetimeFigureOut">
               <a:rPr lang="en-US" dirty="0"/>
               <a:pPr/>
-              <a:t>1/22/20</a:t>
+              <a:t>1/27/20</a:t>
             </a:fld>
             <a:endParaRPr lang="en-US" dirty="0"/>
           </a:p>
@@ -3553,7 +3565,7 @@
             <a:fld id="{B61BEF0D-F0BB-DE4B-95CE-6DB70DBA9567}" type="datetimeFigureOut">
               <a:rPr lang="en-US" dirty="0"/>
               <a:pPr/>
-              <a:t>1/22/20</a:t>
+              <a:t>1/27/20</a:t>
             </a:fld>
             <a:endParaRPr lang="en-US" dirty="0"/>
           </a:p>
@@ -3816,7 +3828,7 @@
             <a:fld id="{B61BEF0D-F0BB-DE4B-95CE-6DB70DBA9567}" type="datetimeFigureOut">
               <a:rPr lang="en-US" dirty="0"/>
               <a:pPr/>
-              <a:t>1/22/20</a:t>
+              <a:t>1/27/20</a:t>
             </a:fld>
             <a:endParaRPr lang="en-US" dirty="0"/>
           </a:p>
@@ -4187,7 +4199,7 @@
             <a:fld id="{B61BEF0D-F0BB-DE4B-95CE-6DB70DBA9567}" type="datetimeFigureOut">
               <a:rPr lang="en-US" dirty="0"/>
               <a:pPr/>
-              <a:t>1/22/20</a:t>
+              <a:t>1/27/20</a:t>
             </a:fld>
             <a:endParaRPr lang="en-US" dirty="0"/>
           </a:p>
@@ -4332,7 +4344,7 @@
             <a:fld id="{B61BEF0D-F0BB-DE4B-95CE-6DB70DBA9567}" type="datetimeFigureOut">
               <a:rPr lang="en-US" dirty="0"/>
               <a:pPr/>
-              <a:t>1/22/20</a:t>
+              <a:t>1/27/20</a:t>
             </a:fld>
             <a:endParaRPr lang="en-US" dirty="0"/>
           </a:p>
@@ -4454,7 +4466,7 @@
             <a:fld id="{B61BEF0D-F0BB-DE4B-95CE-6DB70DBA9567}" type="datetimeFigureOut">
               <a:rPr lang="en-US" dirty="0"/>
               <a:pPr/>
-              <a:t>1/22/20</a:t>
+              <a:t>1/27/20</a:t>
             </a:fld>
             <a:endParaRPr lang="en-US" dirty="0"/>
           </a:p>
@@ -4736,7 +4748,7 @@
             <a:fld id="{B61BEF0D-F0BB-DE4B-95CE-6DB70DBA9567}" type="datetimeFigureOut">
               <a:rPr lang="en-US" dirty="0"/>
               <a:pPr/>
-              <a:t>1/22/20</a:t>
+              <a:t>1/27/20</a:t>
             </a:fld>
             <a:endParaRPr lang="en-US" dirty="0"/>
           </a:p>
@@ -5057,7 +5069,7 @@
             <a:fld id="{B61BEF0D-F0BB-DE4B-95CE-6DB70DBA9567}" type="datetimeFigureOut">
               <a:rPr lang="en-US" dirty="0"/>
               <a:pPr/>
-              <a:t>1/22/20</a:t>
+              <a:t>1/27/20</a:t>
             </a:fld>
             <a:endParaRPr lang="en-US" dirty="0"/>
           </a:p>
@@ -5268,7 +5280,7 @@
             <a:fld id="{B61BEF0D-F0BB-DE4B-95CE-6DB70DBA9567}" type="datetimeFigureOut">
               <a:rPr lang="en-US" dirty="0"/>
               <a:pPr/>
-              <a:t>1/22/20</a:t>
+              <a:t>1/27/20</a:t>
             </a:fld>
             <a:endParaRPr lang="en-US" dirty="0"/>
           </a:p>
@@ -5864,6 +5876,1181 @@
 </p:sld>
 </file>
 
+<file path=ppt/slides/slide10.xml><?xml version="1.0" encoding="utf-8"?>
+<p:sld xmlns:a="http://schemas.openxmlformats.org/drawingml/2006/main" xmlns:r="http://schemas.openxmlformats.org/officeDocument/2006/relationships" xmlns:p="http://schemas.openxmlformats.org/presentationml/2006/main">
+  <p:cSld>
+    <p:spTree>
+      <p:nvGrpSpPr>
+        <p:cNvPr id="1" name=""/>
+        <p:cNvGrpSpPr/>
+        <p:nvPr/>
+      </p:nvGrpSpPr>
+      <p:grpSpPr>
+        <a:xfrm>
+          <a:off x="0" y="0"/>
+          <a:ext cx="0" cy="0"/>
+          <a:chOff x="0" y="0"/>
+          <a:chExt cx="0" cy="0"/>
+        </a:xfrm>
+      </p:grpSpPr>
+      <p:sp>
+        <p:nvSpPr>
+          <p:cNvPr id="2" name="Title 1">
+            <a:extLst>
+              <a:ext uri="{FF2B5EF4-FFF2-40B4-BE49-F238E27FC236}">
+                <a16:creationId xmlns:a16="http://schemas.microsoft.com/office/drawing/2014/main" id="{1253A71A-F4BC-7845-8F1D-6A3661C7692A}"/>
+              </a:ext>
+            </a:extLst>
+          </p:cNvPr>
+          <p:cNvSpPr>
+            <a:spLocks noGrp="1"/>
+          </p:cNvSpPr>
+          <p:nvPr>
+            <p:ph type="title"/>
+          </p:nvPr>
+        </p:nvSpPr>
+        <p:spPr>
+          <a:xfrm>
+            <a:off x="685801" y="609601"/>
+            <a:ext cx="10131425" cy="622852"/>
+          </a:xfrm>
+        </p:spPr>
+        <p:txBody>
+          <a:bodyPr>
+            <a:normAutofit fontScale="90000"/>
+          </a:bodyPr>
+          <a:lstStyle/>
+          <a:p>
+            <a:pPr algn="ctr"/>
+            <a:r>
+              <a:rPr lang="en-US" dirty="0"/>
+              <a:t>Decision Tree Classifier</a:t>
+            </a:r>
+          </a:p>
+        </p:txBody>
+      </p:sp>
+      <p:pic>
+        <p:nvPicPr>
+          <p:cNvPr id="5" name="Content Placeholder 4" descr="A screenshot of a social media post&#10;&#10;Description automatically generated">
+            <a:extLst>
+              <a:ext uri="{FF2B5EF4-FFF2-40B4-BE49-F238E27FC236}">
+                <a16:creationId xmlns:a16="http://schemas.microsoft.com/office/drawing/2014/main" id="{D75AD28D-049D-F845-BF52-86AFE4C69E9C}"/>
+              </a:ext>
+            </a:extLst>
+          </p:cNvPr>
+          <p:cNvPicPr>
+            <a:picLocks noGrp="1" noChangeAspect="1"/>
+          </p:cNvPicPr>
+          <p:nvPr>
+            <p:ph idx="1"/>
+          </p:nvPr>
+        </p:nvPicPr>
+        <p:blipFill>
+          <a:blip r:embed="rId2"/>
+          <a:stretch>
+            <a:fillRect/>
+          </a:stretch>
+        </p:blipFill>
+        <p:spPr>
+          <a:xfrm>
+            <a:off x="1975249" y="1232453"/>
+            <a:ext cx="7814794" cy="5460940"/>
+          </a:xfrm>
+        </p:spPr>
+      </p:pic>
+    </p:spTree>
+    <p:extLst>
+      <p:ext uri="{BB962C8B-B14F-4D97-AF65-F5344CB8AC3E}">
+        <p14:creationId xmlns:p14="http://schemas.microsoft.com/office/powerpoint/2010/main" val="3817962778"/>
+      </p:ext>
+    </p:extLst>
+  </p:cSld>
+  <p:clrMapOvr>
+    <a:masterClrMapping/>
+  </p:clrMapOvr>
+</p:sld>
+</file>
+
+<file path=ppt/slides/slide11.xml><?xml version="1.0" encoding="utf-8"?>
+<p:sld xmlns:a="http://schemas.openxmlformats.org/drawingml/2006/main" xmlns:r="http://schemas.openxmlformats.org/officeDocument/2006/relationships" xmlns:p="http://schemas.openxmlformats.org/presentationml/2006/main">
+  <p:cSld>
+    <p:spTree>
+      <p:nvGrpSpPr>
+        <p:cNvPr id="1" name=""/>
+        <p:cNvGrpSpPr/>
+        <p:nvPr/>
+      </p:nvGrpSpPr>
+      <p:grpSpPr>
+        <a:xfrm>
+          <a:off x="0" y="0"/>
+          <a:ext cx="0" cy="0"/>
+          <a:chOff x="0" y="0"/>
+          <a:chExt cx="0" cy="0"/>
+        </a:xfrm>
+      </p:grpSpPr>
+      <p:sp>
+        <p:nvSpPr>
+          <p:cNvPr id="2" name="Title 1">
+            <a:extLst>
+              <a:ext uri="{FF2B5EF4-FFF2-40B4-BE49-F238E27FC236}">
+                <a16:creationId xmlns:a16="http://schemas.microsoft.com/office/drawing/2014/main" id="{20E20266-08B5-D943-8252-440F25AC01FC}"/>
+              </a:ext>
+            </a:extLst>
+          </p:cNvPr>
+          <p:cNvSpPr>
+            <a:spLocks noGrp="1"/>
+          </p:cNvSpPr>
+          <p:nvPr>
+            <p:ph type="title"/>
+          </p:nvPr>
+        </p:nvSpPr>
+        <p:spPr>
+          <a:xfrm>
+            <a:off x="516836" y="390167"/>
+            <a:ext cx="10131425" cy="602974"/>
+          </a:xfrm>
+        </p:spPr>
+        <p:txBody>
+          <a:bodyPr>
+            <a:normAutofit fontScale="90000"/>
+          </a:bodyPr>
+          <a:lstStyle/>
+          <a:p>
+            <a:pPr algn="ctr"/>
+            <a:r>
+              <a:rPr lang="en-US" dirty="0"/>
+              <a:t>Random Forest Classifier</a:t>
+            </a:r>
+          </a:p>
+        </p:txBody>
+      </p:sp>
+      <p:pic>
+        <p:nvPicPr>
+          <p:cNvPr id="5" name="Content Placeholder 4" descr="A screenshot of a social media post&#10;&#10;Description automatically generated">
+            <a:extLst>
+              <a:ext uri="{FF2B5EF4-FFF2-40B4-BE49-F238E27FC236}">
+                <a16:creationId xmlns:a16="http://schemas.microsoft.com/office/drawing/2014/main" id="{94FC9A4D-811E-7346-BF9B-5E1BC6D8ABA9}"/>
+              </a:ext>
+            </a:extLst>
+          </p:cNvPr>
+          <p:cNvPicPr>
+            <a:picLocks noGrp="1" noChangeAspect="1"/>
+          </p:cNvPicPr>
+          <p:nvPr>
+            <p:ph idx="1"/>
+          </p:nvPr>
+        </p:nvPicPr>
+        <p:blipFill>
+          <a:blip r:embed="rId2"/>
+          <a:stretch>
+            <a:fillRect/>
+          </a:stretch>
+        </p:blipFill>
+        <p:spPr>
+          <a:xfrm>
+            <a:off x="1875927" y="993141"/>
+            <a:ext cx="7794847" cy="5768978"/>
+          </a:xfrm>
+        </p:spPr>
+      </p:pic>
+    </p:spTree>
+    <p:extLst>
+      <p:ext uri="{BB962C8B-B14F-4D97-AF65-F5344CB8AC3E}">
+        <p14:creationId xmlns:p14="http://schemas.microsoft.com/office/powerpoint/2010/main" val="2094327883"/>
+      </p:ext>
+    </p:extLst>
+  </p:cSld>
+  <p:clrMapOvr>
+    <a:masterClrMapping/>
+  </p:clrMapOvr>
+</p:sld>
+</file>
+
+<file path=ppt/slides/slide12.xml><?xml version="1.0" encoding="utf-8"?>
+<p:sld xmlns:a="http://schemas.openxmlformats.org/drawingml/2006/main" xmlns:r="http://schemas.openxmlformats.org/officeDocument/2006/relationships" xmlns:p="http://schemas.openxmlformats.org/presentationml/2006/main">
+  <p:cSld>
+    <p:spTree>
+      <p:nvGrpSpPr>
+        <p:cNvPr id="1" name=""/>
+        <p:cNvGrpSpPr/>
+        <p:nvPr/>
+      </p:nvGrpSpPr>
+      <p:grpSpPr>
+        <a:xfrm>
+          <a:off x="0" y="0"/>
+          <a:ext cx="0" cy="0"/>
+          <a:chOff x="0" y="0"/>
+          <a:chExt cx="0" cy="0"/>
+        </a:xfrm>
+      </p:grpSpPr>
+      <p:sp>
+        <p:nvSpPr>
+          <p:cNvPr id="2" name="Title 1">
+            <a:extLst>
+              <a:ext uri="{FF2B5EF4-FFF2-40B4-BE49-F238E27FC236}">
+                <a16:creationId xmlns:a16="http://schemas.microsoft.com/office/drawing/2014/main" id="{E77DC439-408C-644B-90D5-D186A6F5C033}"/>
+              </a:ext>
+            </a:extLst>
+          </p:cNvPr>
+          <p:cNvSpPr>
+            <a:spLocks noGrp="1"/>
+          </p:cNvSpPr>
+          <p:nvPr>
+            <p:ph type="title"/>
+          </p:nvPr>
+        </p:nvSpPr>
+        <p:spPr/>
+        <p:txBody>
+          <a:bodyPr/>
+          <a:lstStyle/>
+          <a:p>
+            <a:pPr algn="ctr"/>
+            <a:r>
+              <a:rPr lang="en-US" dirty="0"/>
+              <a:t>Model evaluation</a:t>
+            </a:r>
+          </a:p>
+        </p:txBody>
+      </p:sp>
+      <p:sp>
+        <p:nvSpPr>
+          <p:cNvPr id="3" name="Content Placeholder 2">
+            <a:extLst>
+              <a:ext uri="{FF2B5EF4-FFF2-40B4-BE49-F238E27FC236}">
+                <a16:creationId xmlns:a16="http://schemas.microsoft.com/office/drawing/2014/main" id="{C2276BD5-47F1-2D40-A0BF-87D87ED348CB}"/>
+              </a:ext>
+            </a:extLst>
+          </p:cNvPr>
+          <p:cNvSpPr>
+            <a:spLocks noGrp="1"/>
+          </p:cNvSpPr>
+          <p:nvPr>
+            <p:ph idx="1"/>
+          </p:nvPr>
+        </p:nvSpPr>
+        <p:spPr/>
+        <p:txBody>
+          <a:bodyPr>
+            <a:normAutofit/>
+          </a:bodyPr>
+          <a:lstStyle/>
+          <a:p>
+            <a:r>
+              <a:rPr lang="en-US" sz="2400" dirty="0"/>
+              <a:t>For a classification problem, we will evaluate the models based on:</a:t>
+            </a:r>
+          </a:p>
+          <a:p>
+            <a:pPr lvl="1"/>
+            <a:r>
+              <a:rPr lang="en-US" sz="2400" dirty="0"/>
+              <a:t>Confusion Matrix</a:t>
+            </a:r>
+          </a:p>
+          <a:p>
+            <a:pPr lvl="1"/>
+            <a:r>
+              <a:rPr lang="en-US" sz="2400" dirty="0"/>
+              <a:t>Accuracy Score</a:t>
+            </a:r>
+          </a:p>
+          <a:p>
+            <a:pPr lvl="1"/>
+            <a:r>
+              <a:rPr lang="en-US" sz="2400" dirty="0"/>
+              <a:t>Precision</a:t>
+            </a:r>
+          </a:p>
+          <a:p>
+            <a:pPr lvl="1"/>
+            <a:r>
+              <a:rPr lang="en-US" sz="2400" dirty="0"/>
+              <a:t>Recall</a:t>
+            </a:r>
+          </a:p>
+          <a:p>
+            <a:pPr lvl="1"/>
+            <a:r>
+              <a:rPr lang="en-US" sz="2400" dirty="0"/>
+              <a:t>F1 score</a:t>
+            </a:r>
+          </a:p>
+        </p:txBody>
+      </p:sp>
+    </p:spTree>
+    <p:extLst>
+      <p:ext uri="{BB962C8B-B14F-4D97-AF65-F5344CB8AC3E}">
+        <p14:creationId xmlns:p14="http://schemas.microsoft.com/office/powerpoint/2010/main" val="2788663293"/>
+      </p:ext>
+    </p:extLst>
+  </p:cSld>
+  <p:clrMapOvr>
+    <a:masterClrMapping/>
+  </p:clrMapOvr>
+</p:sld>
+</file>
+
+<file path=ppt/slides/slide13.xml><?xml version="1.0" encoding="utf-8"?>
+<p:sld xmlns:a="http://schemas.openxmlformats.org/drawingml/2006/main" xmlns:r="http://schemas.openxmlformats.org/officeDocument/2006/relationships" xmlns:p="http://schemas.openxmlformats.org/presentationml/2006/main">
+  <p:cSld>
+    <p:spTree>
+      <p:nvGrpSpPr>
+        <p:cNvPr id="1" name=""/>
+        <p:cNvGrpSpPr/>
+        <p:nvPr/>
+      </p:nvGrpSpPr>
+      <p:grpSpPr>
+        <a:xfrm>
+          <a:off x="0" y="0"/>
+          <a:ext cx="0" cy="0"/>
+          <a:chOff x="0" y="0"/>
+          <a:chExt cx="0" cy="0"/>
+        </a:xfrm>
+      </p:grpSpPr>
+      <p:sp>
+        <p:nvSpPr>
+          <p:cNvPr id="2" name="Title 1">
+            <a:extLst>
+              <a:ext uri="{FF2B5EF4-FFF2-40B4-BE49-F238E27FC236}">
+                <a16:creationId xmlns:a16="http://schemas.microsoft.com/office/drawing/2014/main" id="{3196E4D8-7F46-B34A-B1DD-191E824773FF}"/>
+              </a:ext>
+            </a:extLst>
+          </p:cNvPr>
+          <p:cNvSpPr>
+            <a:spLocks noGrp="1"/>
+          </p:cNvSpPr>
+          <p:nvPr>
+            <p:ph type="title"/>
+          </p:nvPr>
+        </p:nvSpPr>
+        <p:spPr>
+          <a:xfrm>
+            <a:off x="685801" y="609600"/>
+            <a:ext cx="10131425" cy="563217"/>
+          </a:xfrm>
+        </p:spPr>
+        <p:txBody>
+          <a:bodyPr>
+            <a:normAutofit fontScale="90000"/>
+          </a:bodyPr>
+          <a:lstStyle/>
+          <a:p>
+            <a:pPr algn="ctr"/>
+            <a:r>
+              <a:rPr lang="en-US" dirty="0"/>
+              <a:t>CONFUSION MATRIX of decision tree classifier</a:t>
+            </a:r>
+          </a:p>
+        </p:txBody>
+      </p:sp>
+      <p:pic>
+        <p:nvPicPr>
+          <p:cNvPr id="5" name="Content Placeholder 4" descr="A close up of a piece of paper&#10;&#10;Description automatically generated">
+            <a:extLst>
+              <a:ext uri="{FF2B5EF4-FFF2-40B4-BE49-F238E27FC236}">
+                <a16:creationId xmlns:a16="http://schemas.microsoft.com/office/drawing/2014/main" id="{AF7526DB-FD9D-8A48-8AB3-DB7456B583F0}"/>
+              </a:ext>
+            </a:extLst>
+          </p:cNvPr>
+          <p:cNvPicPr>
+            <a:picLocks noGrp="1" noChangeAspect="1"/>
+          </p:cNvPicPr>
+          <p:nvPr>
+            <p:ph idx="1"/>
+          </p:nvPr>
+        </p:nvPicPr>
+        <p:blipFill>
+          <a:blip r:embed="rId2"/>
+          <a:stretch>
+            <a:fillRect/>
+          </a:stretch>
+        </p:blipFill>
+        <p:spPr>
+          <a:xfrm>
+            <a:off x="1030347" y="1266894"/>
+            <a:ext cx="10131306" cy="4981506"/>
+          </a:xfrm>
+        </p:spPr>
+      </p:pic>
+    </p:spTree>
+    <p:extLst>
+      <p:ext uri="{BB962C8B-B14F-4D97-AF65-F5344CB8AC3E}">
+        <p14:creationId xmlns:p14="http://schemas.microsoft.com/office/powerpoint/2010/main" val="3897759425"/>
+      </p:ext>
+    </p:extLst>
+  </p:cSld>
+  <p:clrMapOvr>
+    <a:masterClrMapping/>
+  </p:clrMapOvr>
+</p:sld>
+</file>
+
+<file path=ppt/slides/slide14.xml><?xml version="1.0" encoding="utf-8"?>
+<p:sld xmlns:a="http://schemas.openxmlformats.org/drawingml/2006/main" xmlns:r="http://schemas.openxmlformats.org/officeDocument/2006/relationships" xmlns:p="http://schemas.openxmlformats.org/presentationml/2006/main">
+  <p:cSld>
+    <p:spTree>
+      <p:nvGrpSpPr>
+        <p:cNvPr id="1" name=""/>
+        <p:cNvGrpSpPr/>
+        <p:nvPr/>
+      </p:nvGrpSpPr>
+      <p:grpSpPr>
+        <a:xfrm>
+          <a:off x="0" y="0"/>
+          <a:ext cx="0" cy="0"/>
+          <a:chOff x="0" y="0"/>
+          <a:chExt cx="0" cy="0"/>
+        </a:xfrm>
+      </p:grpSpPr>
+      <p:sp>
+        <p:nvSpPr>
+          <p:cNvPr id="2" name="Title 1">
+            <a:extLst>
+              <a:ext uri="{FF2B5EF4-FFF2-40B4-BE49-F238E27FC236}">
+                <a16:creationId xmlns:a16="http://schemas.microsoft.com/office/drawing/2014/main" id="{FAFC8C6A-3753-C945-8FE4-880372B61AEA}"/>
+              </a:ext>
+            </a:extLst>
+          </p:cNvPr>
+          <p:cNvSpPr>
+            <a:spLocks noGrp="1"/>
+          </p:cNvSpPr>
+          <p:nvPr>
+            <p:ph type="title"/>
+          </p:nvPr>
+        </p:nvSpPr>
+        <p:spPr/>
+        <p:txBody>
+          <a:bodyPr/>
+          <a:lstStyle/>
+          <a:p>
+            <a:pPr algn="ctr"/>
+            <a:r>
+              <a:rPr lang="en-US" dirty="0"/>
+              <a:t>ACCURACY SCORE</a:t>
+            </a:r>
+          </a:p>
+        </p:txBody>
+      </p:sp>
+      <p:graphicFrame>
+        <p:nvGraphicFramePr>
+          <p:cNvPr id="4" name="Content Placeholder 3">
+            <a:extLst>
+              <a:ext uri="{FF2B5EF4-FFF2-40B4-BE49-F238E27FC236}">
+                <a16:creationId xmlns:a16="http://schemas.microsoft.com/office/drawing/2014/main" id="{980D1311-84BF-554A-A6E5-AD9E22157F5C}"/>
+              </a:ext>
+            </a:extLst>
+          </p:cNvPr>
+          <p:cNvGraphicFramePr>
+            <a:graphicFrameLocks noGrp="1"/>
+          </p:cNvGraphicFramePr>
+          <p:nvPr>
+            <p:ph idx="1"/>
+            <p:extLst>
+              <p:ext uri="{D42A27DB-BD31-4B8C-83A1-F6EECF244321}">
+                <p14:modId xmlns:p14="http://schemas.microsoft.com/office/powerpoint/2010/main" val="3824294956"/>
+              </p:ext>
+            </p:extLst>
+          </p:nvPr>
+        </p:nvGraphicFramePr>
+        <p:xfrm>
+          <a:off x="685799" y="2141537"/>
+          <a:ext cx="10783959" cy="1737360"/>
+        </p:xfrm>
+        <a:graphic>
+          <a:graphicData uri="http://schemas.openxmlformats.org/drawingml/2006/table">
+            <a:tbl>
+              <a:tblPr firstRow="1" bandRow="1">
+                <a:tableStyleId>{5C22544A-7EE6-4342-B048-85BDC9FD1C3A}</a:tableStyleId>
+              </a:tblPr>
+              <a:tblGrid>
+                <a:gridCol w="3594653">
+                  <a:extLst>
+                    <a:ext uri="{9D8B030D-6E8A-4147-A177-3AD203B41FA5}">
+                      <a16:colId xmlns:a16="http://schemas.microsoft.com/office/drawing/2014/main" val="3175757522"/>
+                    </a:ext>
+                  </a:extLst>
+                </a:gridCol>
+                <a:gridCol w="3594653">
+                  <a:extLst>
+                    <a:ext uri="{9D8B030D-6E8A-4147-A177-3AD203B41FA5}">
+                      <a16:colId xmlns:a16="http://schemas.microsoft.com/office/drawing/2014/main" val="1033844060"/>
+                    </a:ext>
+                  </a:extLst>
+                </a:gridCol>
+                <a:gridCol w="3594653">
+                  <a:extLst>
+                    <a:ext uri="{9D8B030D-6E8A-4147-A177-3AD203B41FA5}">
+                      <a16:colId xmlns:a16="http://schemas.microsoft.com/office/drawing/2014/main" val="2460304631"/>
+                    </a:ext>
+                  </a:extLst>
+                </a:gridCol>
+              </a:tblGrid>
+              <a:tr h="364067">
+                <a:tc>
+                  <a:txBody>
+                    <a:bodyPr/>
+                    <a:lstStyle/>
+                    <a:p>
+                      <a:r>
+                        <a:rPr lang="en-US" dirty="0"/>
+                        <a:t>Using Base Model</a:t>
+                      </a:r>
+                    </a:p>
+                    <a:p>
+                      <a:r>
+                        <a:rPr lang="en-US" dirty="0"/>
+                        <a:t>Model Name</a:t>
+                      </a:r>
+                    </a:p>
+                  </a:txBody>
+                  <a:tcPr/>
+                </a:tc>
+                <a:tc>
+                  <a:txBody>
+                    <a:bodyPr/>
+                    <a:lstStyle/>
+                    <a:p>
+                      <a:r>
+                        <a:rPr lang="en-US" dirty="0"/>
+                        <a:t>Train Accuracy (%)</a:t>
+                      </a:r>
+                    </a:p>
+                  </a:txBody>
+                  <a:tcPr/>
+                </a:tc>
+                <a:tc>
+                  <a:txBody>
+                    <a:bodyPr/>
+                    <a:lstStyle/>
+                    <a:p>
+                      <a:r>
+                        <a:rPr lang="en-US" dirty="0"/>
+                        <a:t>Test Accuracy (%)</a:t>
+                      </a:r>
+                    </a:p>
+                  </a:txBody>
+                  <a:tcPr/>
+                </a:tc>
+                <a:extLst>
+                  <a:ext uri="{0D108BD9-81ED-4DB2-BD59-A6C34878D82A}">
+                    <a16:rowId xmlns:a16="http://schemas.microsoft.com/office/drawing/2014/main" val="2983603292"/>
+                  </a:ext>
+                </a:extLst>
+              </a:tr>
+              <a:tr h="364067">
+                <a:tc>
+                  <a:txBody>
+                    <a:bodyPr/>
+                    <a:lstStyle/>
+                    <a:p>
+                      <a:r>
+                        <a:rPr lang="en-US" dirty="0"/>
+                        <a:t>Logistic Regression</a:t>
+                      </a:r>
+                    </a:p>
+                  </a:txBody>
+                  <a:tcPr/>
+                </a:tc>
+                <a:tc>
+                  <a:txBody>
+                    <a:bodyPr/>
+                    <a:lstStyle/>
+                    <a:p>
+                      <a:r>
+                        <a:rPr lang="en-US" dirty="0"/>
+                        <a:t>49.2</a:t>
+                      </a:r>
+                    </a:p>
+                  </a:txBody>
+                  <a:tcPr/>
+                </a:tc>
+                <a:tc>
+                  <a:txBody>
+                    <a:bodyPr/>
+                    <a:lstStyle/>
+                    <a:p>
+                      <a:r>
+                        <a:rPr lang="en-US" dirty="0"/>
+                        <a:t>47.9</a:t>
+                      </a:r>
+                    </a:p>
+                  </a:txBody>
+                  <a:tcPr/>
+                </a:tc>
+                <a:extLst>
+                  <a:ext uri="{0D108BD9-81ED-4DB2-BD59-A6C34878D82A}">
+                    <a16:rowId xmlns:a16="http://schemas.microsoft.com/office/drawing/2014/main" val="3289832378"/>
+                  </a:ext>
+                </a:extLst>
+              </a:tr>
+              <a:tr h="364067">
+                <a:tc>
+                  <a:txBody>
+                    <a:bodyPr/>
+                    <a:lstStyle/>
+                    <a:p>
+                      <a:r>
+                        <a:rPr lang="en-US" dirty="0"/>
+                        <a:t>Decision Tree</a:t>
+                      </a:r>
+                    </a:p>
+                  </a:txBody>
+                  <a:tcPr/>
+                </a:tc>
+                <a:tc>
+                  <a:txBody>
+                    <a:bodyPr/>
+                    <a:lstStyle/>
+                    <a:p>
+                      <a:r>
+                        <a:rPr lang="en-US" dirty="0"/>
+                        <a:t>100</a:t>
+                      </a:r>
+                    </a:p>
+                  </a:txBody>
+                  <a:tcPr/>
+                </a:tc>
+                <a:tc>
+                  <a:txBody>
+                    <a:bodyPr/>
+                    <a:lstStyle/>
+                    <a:p>
+                      <a:r>
+                        <a:rPr lang="en-US" dirty="0"/>
+                        <a:t>40.3</a:t>
+                      </a:r>
+                    </a:p>
+                  </a:txBody>
+                  <a:tcPr/>
+                </a:tc>
+                <a:extLst>
+                  <a:ext uri="{0D108BD9-81ED-4DB2-BD59-A6C34878D82A}">
+                    <a16:rowId xmlns:a16="http://schemas.microsoft.com/office/drawing/2014/main" val="268595593"/>
+                  </a:ext>
+                </a:extLst>
+              </a:tr>
+              <a:tr h="364067">
+                <a:tc>
+                  <a:txBody>
+                    <a:bodyPr/>
+                    <a:lstStyle/>
+                    <a:p>
+                      <a:r>
+                        <a:rPr lang="en-US" dirty="0"/>
+                        <a:t>Random Forest</a:t>
+                      </a:r>
+                    </a:p>
+                  </a:txBody>
+                  <a:tcPr/>
+                </a:tc>
+                <a:tc>
+                  <a:txBody>
+                    <a:bodyPr/>
+                    <a:lstStyle/>
+                    <a:p>
+                      <a:r>
+                        <a:rPr lang="en-US" dirty="0"/>
+                        <a:t>98.9</a:t>
+                      </a:r>
+                    </a:p>
+                  </a:txBody>
+                  <a:tcPr/>
+                </a:tc>
+                <a:tc>
+                  <a:txBody>
+                    <a:bodyPr/>
+                    <a:lstStyle/>
+                    <a:p>
+                      <a:r>
+                        <a:rPr lang="en-US" dirty="0"/>
+                        <a:t>48.4</a:t>
+                      </a:r>
+                    </a:p>
+                  </a:txBody>
+                  <a:tcPr/>
+                </a:tc>
+                <a:extLst>
+                  <a:ext uri="{0D108BD9-81ED-4DB2-BD59-A6C34878D82A}">
+                    <a16:rowId xmlns:a16="http://schemas.microsoft.com/office/drawing/2014/main" val="2448090497"/>
+                  </a:ext>
+                </a:extLst>
+              </a:tr>
+            </a:tbl>
+          </a:graphicData>
+        </a:graphic>
+      </p:graphicFrame>
+      <p:graphicFrame>
+        <p:nvGraphicFramePr>
+          <p:cNvPr id="5" name="Content Placeholder 3">
+            <a:extLst>
+              <a:ext uri="{FF2B5EF4-FFF2-40B4-BE49-F238E27FC236}">
+                <a16:creationId xmlns:a16="http://schemas.microsoft.com/office/drawing/2014/main" id="{7F02B47F-F918-CD4B-8BDC-B405A3E044A9}"/>
+              </a:ext>
+            </a:extLst>
+          </p:cNvPr>
+          <p:cNvGraphicFramePr>
+            <a:graphicFrameLocks/>
+          </p:cNvGraphicFramePr>
+          <p:nvPr>
+            <p:extLst>
+              <p:ext uri="{D42A27DB-BD31-4B8C-83A1-F6EECF244321}">
+                <p14:modId xmlns:p14="http://schemas.microsoft.com/office/powerpoint/2010/main" val="186567651"/>
+              </p:ext>
+            </p:extLst>
+          </p:nvPr>
+        </p:nvGraphicFramePr>
+        <p:xfrm>
+          <a:off x="685798" y="4569998"/>
+          <a:ext cx="10783959" cy="1371600"/>
+        </p:xfrm>
+        <a:graphic>
+          <a:graphicData uri="http://schemas.openxmlformats.org/drawingml/2006/table">
+            <a:tbl>
+              <a:tblPr firstRow="1" bandRow="1">
+                <a:tableStyleId>{5C22544A-7EE6-4342-B048-85BDC9FD1C3A}</a:tableStyleId>
+              </a:tblPr>
+              <a:tblGrid>
+                <a:gridCol w="3594653">
+                  <a:extLst>
+                    <a:ext uri="{9D8B030D-6E8A-4147-A177-3AD203B41FA5}">
+                      <a16:colId xmlns:a16="http://schemas.microsoft.com/office/drawing/2014/main" val="3175757522"/>
+                    </a:ext>
+                  </a:extLst>
+                </a:gridCol>
+                <a:gridCol w="3594653">
+                  <a:extLst>
+                    <a:ext uri="{9D8B030D-6E8A-4147-A177-3AD203B41FA5}">
+                      <a16:colId xmlns:a16="http://schemas.microsoft.com/office/drawing/2014/main" val="1033844060"/>
+                    </a:ext>
+                  </a:extLst>
+                </a:gridCol>
+                <a:gridCol w="3594653">
+                  <a:extLst>
+                    <a:ext uri="{9D8B030D-6E8A-4147-A177-3AD203B41FA5}">
+                      <a16:colId xmlns:a16="http://schemas.microsoft.com/office/drawing/2014/main" val="2460304631"/>
+                    </a:ext>
+                  </a:extLst>
+                </a:gridCol>
+              </a:tblGrid>
+              <a:tr h="364067">
+                <a:tc>
+                  <a:txBody>
+                    <a:bodyPr/>
+                    <a:lstStyle/>
+                    <a:p>
+                      <a:r>
+                        <a:rPr lang="en-US" dirty="0"/>
+                        <a:t>Using </a:t>
+                      </a:r>
+                      <a:r>
+                        <a:rPr lang="en-US" dirty="0" err="1"/>
+                        <a:t>GridSearchCV</a:t>
+                      </a:r>
+                      <a:endParaRPr lang="en-US" dirty="0"/>
+                    </a:p>
+                    <a:p>
+                      <a:r>
+                        <a:rPr lang="en-US" dirty="0"/>
+                        <a:t>Model Name</a:t>
+                      </a:r>
+                    </a:p>
+                  </a:txBody>
+                  <a:tcPr/>
+                </a:tc>
+                <a:tc>
+                  <a:txBody>
+                    <a:bodyPr/>
+                    <a:lstStyle/>
+                    <a:p>
+                      <a:r>
+                        <a:rPr lang="en-US" dirty="0"/>
+                        <a:t>Train Accuracy (%)</a:t>
+                      </a:r>
+                    </a:p>
+                  </a:txBody>
+                  <a:tcPr/>
+                </a:tc>
+                <a:tc>
+                  <a:txBody>
+                    <a:bodyPr/>
+                    <a:lstStyle/>
+                    <a:p>
+                      <a:r>
+                        <a:rPr lang="en-US" dirty="0"/>
+                        <a:t>Test Accuracy (%)</a:t>
+                      </a:r>
+                    </a:p>
+                  </a:txBody>
+                  <a:tcPr/>
+                </a:tc>
+                <a:extLst>
+                  <a:ext uri="{0D108BD9-81ED-4DB2-BD59-A6C34878D82A}">
+                    <a16:rowId xmlns:a16="http://schemas.microsoft.com/office/drawing/2014/main" val="2983603292"/>
+                  </a:ext>
+                </a:extLst>
+              </a:tr>
+              <a:tr h="364067">
+                <a:tc>
+                  <a:txBody>
+                    <a:bodyPr/>
+                    <a:lstStyle/>
+                    <a:p>
+                      <a:r>
+                        <a:rPr lang="en-US" dirty="0"/>
+                        <a:t>Decision Tree</a:t>
+                      </a:r>
+                    </a:p>
+                  </a:txBody>
+                  <a:tcPr/>
+                </a:tc>
+                <a:tc>
+                  <a:txBody>
+                    <a:bodyPr/>
+                    <a:lstStyle/>
+                    <a:p>
+                      <a:r>
+                        <a:rPr lang="en-US" dirty="0"/>
+                        <a:t>53.9</a:t>
+                      </a:r>
+                    </a:p>
+                  </a:txBody>
+                  <a:tcPr/>
+                </a:tc>
+                <a:tc>
+                  <a:txBody>
+                    <a:bodyPr/>
+                    <a:lstStyle/>
+                    <a:p>
+                      <a:r>
+                        <a:rPr lang="en-US" dirty="0"/>
+                        <a:t>51.9</a:t>
+                      </a:r>
+                    </a:p>
+                  </a:txBody>
+                  <a:tcPr/>
+                </a:tc>
+                <a:extLst>
+                  <a:ext uri="{0D108BD9-81ED-4DB2-BD59-A6C34878D82A}">
+                    <a16:rowId xmlns:a16="http://schemas.microsoft.com/office/drawing/2014/main" val="268595593"/>
+                  </a:ext>
+                </a:extLst>
+              </a:tr>
+              <a:tr h="364067">
+                <a:tc>
+                  <a:txBody>
+                    <a:bodyPr/>
+                    <a:lstStyle/>
+                    <a:p>
+                      <a:r>
+                        <a:rPr lang="en-US" dirty="0"/>
+                        <a:t>Random Forest</a:t>
+                      </a:r>
+                    </a:p>
+                  </a:txBody>
+                  <a:tcPr/>
+                </a:tc>
+                <a:tc>
+                  <a:txBody>
+                    <a:bodyPr/>
+                    <a:lstStyle/>
+                    <a:p>
+                      <a:r>
+                        <a:rPr lang="en-US" dirty="0"/>
+                        <a:t>48.4</a:t>
+                      </a:r>
+                    </a:p>
+                  </a:txBody>
+                  <a:tcPr/>
+                </a:tc>
+                <a:tc>
+                  <a:txBody>
+                    <a:bodyPr/>
+                    <a:lstStyle/>
+                    <a:p>
+                      <a:r>
+                        <a:rPr lang="en-US" dirty="0"/>
+                        <a:t>48.6</a:t>
+                      </a:r>
+                    </a:p>
+                  </a:txBody>
+                  <a:tcPr/>
+                </a:tc>
+                <a:extLst>
+                  <a:ext uri="{0D108BD9-81ED-4DB2-BD59-A6C34878D82A}">
+                    <a16:rowId xmlns:a16="http://schemas.microsoft.com/office/drawing/2014/main" val="2448090497"/>
+                  </a:ext>
+                </a:extLst>
+              </a:tr>
+            </a:tbl>
+          </a:graphicData>
+        </a:graphic>
+      </p:graphicFrame>
+    </p:spTree>
+    <p:extLst>
+      <p:ext uri="{BB962C8B-B14F-4D97-AF65-F5344CB8AC3E}">
+        <p14:creationId xmlns:p14="http://schemas.microsoft.com/office/powerpoint/2010/main" val="2285955354"/>
+      </p:ext>
+    </p:extLst>
+  </p:cSld>
+  <p:clrMapOvr>
+    <a:masterClrMapping/>
+  </p:clrMapOvr>
+</p:sld>
+</file>
+
+<file path=ppt/slides/slide15.xml><?xml version="1.0" encoding="utf-8"?>
+<p:sld xmlns:a="http://schemas.openxmlformats.org/drawingml/2006/main" xmlns:r="http://schemas.openxmlformats.org/officeDocument/2006/relationships" xmlns:p="http://schemas.openxmlformats.org/presentationml/2006/main">
+  <p:cSld>
+    <p:spTree>
+      <p:nvGrpSpPr>
+        <p:cNvPr id="1" name=""/>
+        <p:cNvGrpSpPr/>
+        <p:nvPr/>
+      </p:nvGrpSpPr>
+      <p:grpSpPr>
+        <a:xfrm>
+          <a:off x="0" y="0"/>
+          <a:ext cx="0" cy="0"/>
+          <a:chOff x="0" y="0"/>
+          <a:chExt cx="0" cy="0"/>
+        </a:xfrm>
+      </p:grpSpPr>
+      <p:sp>
+        <p:nvSpPr>
+          <p:cNvPr id="2" name="Title 1">
+            <a:extLst>
+              <a:ext uri="{FF2B5EF4-FFF2-40B4-BE49-F238E27FC236}">
+                <a16:creationId xmlns:a16="http://schemas.microsoft.com/office/drawing/2014/main" id="{FAFC8C6A-3753-C945-8FE4-880372B61AEA}"/>
+              </a:ext>
+            </a:extLst>
+          </p:cNvPr>
+          <p:cNvSpPr>
+            <a:spLocks noGrp="1"/>
+          </p:cNvSpPr>
+          <p:nvPr>
+            <p:ph type="title"/>
+          </p:nvPr>
+        </p:nvSpPr>
+        <p:spPr>
+          <a:xfrm>
+            <a:off x="685801" y="609601"/>
+            <a:ext cx="10131425" cy="602974"/>
+          </a:xfrm>
+        </p:spPr>
+        <p:txBody>
+          <a:bodyPr>
+            <a:normAutofit fontScale="90000"/>
+          </a:bodyPr>
+          <a:lstStyle/>
+          <a:p>
+            <a:pPr algn="ctr"/>
+            <a:r>
+              <a:rPr lang="en-US" dirty="0"/>
+              <a:t>CLASSIFICATION REPORT of decision tree classifier</a:t>
+            </a:r>
+          </a:p>
+        </p:txBody>
+      </p:sp>
+      <p:pic>
+        <p:nvPicPr>
+          <p:cNvPr id="6" name="Content Placeholder 5" descr="A screenshot of a cell phone&#10;&#10;Description automatically generated">
+            <a:extLst>
+              <a:ext uri="{FF2B5EF4-FFF2-40B4-BE49-F238E27FC236}">
+                <a16:creationId xmlns:a16="http://schemas.microsoft.com/office/drawing/2014/main" id="{19917CB5-40A9-7F4C-8F19-8DF910F7DFBD}"/>
+              </a:ext>
+            </a:extLst>
+          </p:cNvPr>
+          <p:cNvPicPr>
+            <a:picLocks noGrp="1" noChangeAspect="1"/>
+          </p:cNvPicPr>
+          <p:nvPr>
+            <p:ph idx="1"/>
+          </p:nvPr>
+        </p:nvPicPr>
+        <p:blipFill>
+          <a:blip r:embed="rId2"/>
+          <a:stretch>
+            <a:fillRect/>
+          </a:stretch>
+        </p:blipFill>
+        <p:spPr>
+          <a:xfrm>
+            <a:off x="1249361" y="1363145"/>
+            <a:ext cx="9391287" cy="4885254"/>
+          </a:xfrm>
+        </p:spPr>
+      </p:pic>
+    </p:spTree>
+    <p:extLst>
+      <p:ext uri="{BB962C8B-B14F-4D97-AF65-F5344CB8AC3E}">
+        <p14:creationId xmlns:p14="http://schemas.microsoft.com/office/powerpoint/2010/main" val="3626535524"/>
+      </p:ext>
+    </p:extLst>
+  </p:cSld>
+  <p:clrMapOvr>
+    <a:masterClrMapping/>
+  </p:clrMapOvr>
+</p:sld>
+</file>
+
+<file path=ppt/slides/slide16.xml><?xml version="1.0" encoding="utf-8"?>
+<p:sld xmlns:a="http://schemas.openxmlformats.org/drawingml/2006/main" xmlns:r="http://schemas.openxmlformats.org/officeDocument/2006/relationships" xmlns:p="http://schemas.openxmlformats.org/presentationml/2006/main">
+  <p:cSld>
+    <p:spTree>
+      <p:nvGrpSpPr>
+        <p:cNvPr id="1" name=""/>
+        <p:cNvGrpSpPr/>
+        <p:nvPr/>
+      </p:nvGrpSpPr>
+      <p:grpSpPr>
+        <a:xfrm>
+          <a:off x="0" y="0"/>
+          <a:ext cx="0" cy="0"/>
+          <a:chOff x="0" y="0"/>
+          <a:chExt cx="0" cy="0"/>
+        </a:xfrm>
+      </p:grpSpPr>
+      <p:sp>
+        <p:nvSpPr>
+          <p:cNvPr id="2" name="Title 1">
+            <a:extLst>
+              <a:ext uri="{FF2B5EF4-FFF2-40B4-BE49-F238E27FC236}">
+                <a16:creationId xmlns:a16="http://schemas.microsoft.com/office/drawing/2014/main" id="{639131A9-171F-C043-B9DE-EAAD5DB68E94}"/>
+              </a:ext>
+            </a:extLst>
+          </p:cNvPr>
+          <p:cNvSpPr>
+            <a:spLocks noGrp="1"/>
+          </p:cNvSpPr>
+          <p:nvPr>
+            <p:ph type="title"/>
+          </p:nvPr>
+        </p:nvSpPr>
+        <p:spPr>
+          <a:xfrm>
+            <a:off x="685801" y="609601"/>
+            <a:ext cx="10131425" cy="457200"/>
+          </a:xfrm>
+        </p:spPr>
+        <p:txBody>
+          <a:bodyPr>
+            <a:normAutofit fontScale="90000"/>
+          </a:bodyPr>
+          <a:lstStyle/>
+          <a:p>
+            <a:pPr algn="ctr"/>
+            <a:r>
+              <a:rPr lang="en-US" dirty="0"/>
+              <a:t>conclusion</a:t>
+            </a:r>
+          </a:p>
+        </p:txBody>
+      </p:sp>
+      <p:sp>
+        <p:nvSpPr>
+          <p:cNvPr id="3" name="Content Placeholder 2">
+            <a:extLst>
+              <a:ext uri="{FF2B5EF4-FFF2-40B4-BE49-F238E27FC236}">
+                <a16:creationId xmlns:a16="http://schemas.microsoft.com/office/drawing/2014/main" id="{760D2656-598F-3445-81C0-75EB8066FBBC}"/>
+              </a:ext>
+            </a:extLst>
+          </p:cNvPr>
+          <p:cNvSpPr>
+            <a:spLocks noGrp="1"/>
+          </p:cNvSpPr>
+          <p:nvPr>
+            <p:ph idx="1"/>
+          </p:nvPr>
+        </p:nvSpPr>
+        <p:spPr>
+          <a:xfrm>
+            <a:off x="685801" y="1421296"/>
+            <a:ext cx="10131425" cy="4369904"/>
+          </a:xfrm>
+        </p:spPr>
+        <p:txBody>
+          <a:bodyPr>
+            <a:noAutofit/>
+          </a:bodyPr>
+          <a:lstStyle/>
+          <a:p>
+            <a:pPr marL="342900" indent="-342900">
+              <a:buFont typeface="Arial" panose="020B0604020202020204" pitchFamily="34" charset="0"/>
+              <a:buChar char="•"/>
+            </a:pPr>
+            <a:r>
+              <a:rPr lang="en-IN" sz="2400" dirty="0"/>
+              <a:t>We have compared the performance of the models using various model evaluation techniques.</a:t>
+            </a:r>
+          </a:p>
+          <a:p>
+            <a:pPr marL="342900" indent="-342900">
+              <a:buFont typeface="Arial" panose="020B0604020202020204" pitchFamily="34" charset="0"/>
+              <a:buChar char="•"/>
+            </a:pPr>
+            <a:r>
+              <a:rPr lang="en-IN" sz="2400" dirty="0"/>
+              <a:t>Our objective is to precisely predict Response so that life insurance applications can be scrutinized easily, and correct decision be made.</a:t>
+            </a:r>
+          </a:p>
+          <a:p>
+            <a:pPr marL="342900" indent="-342900">
+              <a:buFont typeface="Arial" panose="020B0604020202020204" pitchFamily="34" charset="0"/>
+              <a:buChar char="•"/>
+            </a:pPr>
+            <a:r>
+              <a:rPr lang="en-IN" sz="2400" dirty="0"/>
+              <a:t>Model evaluation step shows Decision Tree Classifier model is more suitable for this dataset. </a:t>
+            </a:r>
+          </a:p>
+          <a:p>
+            <a:pPr marL="342900" indent="-342900">
+              <a:buFont typeface="Arial" panose="020B0604020202020204" pitchFamily="34" charset="0"/>
+              <a:buChar char="•"/>
+            </a:pPr>
+            <a:r>
+              <a:rPr lang="en-IN" sz="2400" dirty="0"/>
+              <a:t>After Decision tree, Random Forest Classifier also has very good accuracy score.</a:t>
+            </a:r>
+          </a:p>
+          <a:p>
+            <a:pPr marL="342900" indent="-342900">
+              <a:buFont typeface="Arial" panose="020B0604020202020204" pitchFamily="34" charset="0"/>
+              <a:buChar char="•"/>
+            </a:pPr>
+            <a:r>
+              <a:rPr lang="en-IN" sz="2400" dirty="0"/>
+              <a:t>Advanced model techniques like </a:t>
+            </a:r>
+            <a:r>
+              <a:rPr lang="en-IN" sz="2400" dirty="0" err="1"/>
+              <a:t>xgBoost</a:t>
+            </a:r>
+            <a:r>
+              <a:rPr lang="en-IN" sz="2400" dirty="0"/>
+              <a:t>, neural network can be applied to further improve model accuracy</a:t>
+            </a:r>
+            <a:r>
+              <a:rPr lang="en-US" sz="2400" dirty="0"/>
+              <a:t>.</a:t>
+            </a:r>
+            <a:endParaRPr lang="en-IN" sz="2400" dirty="0"/>
+          </a:p>
+        </p:txBody>
+      </p:sp>
+    </p:spTree>
+    <p:extLst>
+      <p:ext uri="{BB962C8B-B14F-4D97-AF65-F5344CB8AC3E}">
+        <p14:creationId xmlns:p14="http://schemas.microsoft.com/office/powerpoint/2010/main" val="3775100408"/>
+      </p:ext>
+    </p:extLst>
+  </p:cSld>
+  <p:clrMapOvr>
+    <a:masterClrMapping/>
+  </p:clrMapOvr>
+</p:sld>
+</file>
+
 <file path=ppt/slides/slide2.xml><?xml version="1.0" encoding="utf-8"?>
 <p:sld xmlns:a="http://schemas.openxmlformats.org/drawingml/2006/main" xmlns:r="http://schemas.openxmlformats.org/officeDocument/2006/relationships" xmlns:p="http://schemas.openxmlformats.org/presentationml/2006/main">
   <p:cSld>
@@ -6225,7 +7412,7 @@
             <a:pPr algn="ctr"/>
             <a:r>
               <a:rPr lang="en-US" dirty="0"/>
-              <a:t>DATA CLEANING – missing data</a:t>
+              <a:t>missing data imputation</a:t>
             </a:r>
           </a:p>
         </p:txBody>
@@ -6320,7 +7507,7 @@
             <a:pPr algn="ctr"/>
             <a:r>
               <a:rPr lang="en-US" dirty="0"/>
-              <a:t>EDA – Feature selection - correlation</a:t>
+              <a:t>Correlation using heatmap</a:t>
             </a:r>
           </a:p>
         </p:txBody>
@@ -6449,6 +7636,44 @@
           </a:xfrm>
         </p:spPr>
       </p:pic>
+      <p:sp>
+        <p:nvSpPr>
+          <p:cNvPr id="3" name="TextBox 2">
+            <a:extLst>
+              <a:ext uri="{FF2B5EF4-FFF2-40B4-BE49-F238E27FC236}">
+                <a16:creationId xmlns:a16="http://schemas.microsoft.com/office/drawing/2014/main" id="{8D652416-8B02-7248-B59C-10E1091236D6}"/>
+              </a:ext>
+            </a:extLst>
+          </p:cNvPr>
+          <p:cNvSpPr txBox="1"/>
+          <p:nvPr/>
+        </p:nvSpPr>
+        <p:spPr>
+          <a:xfrm>
+            <a:off x="2054006" y="6248400"/>
+            <a:ext cx="9028124" cy="923330"/>
+          </a:xfrm>
+          <a:prstGeom prst="rect">
+            <a:avLst/>
+          </a:prstGeom>
+          <a:noFill/>
+        </p:spPr>
+        <p:txBody>
+          <a:bodyPr wrap="square" rtlCol="0">
+            <a:spAutoFit/>
+          </a:bodyPr>
+          <a:lstStyle/>
+          <a:p>
+            <a:r>
+              <a:rPr lang="en-IN" dirty="0"/>
+              <a:t>The Response column data had more values closing to Level 8 indicating majority of the applicants fall in this category.</a:t>
+            </a:r>
+          </a:p>
+          <a:p>
+            <a:endParaRPr lang="en-US" dirty="0"/>
+          </a:p>
+        </p:txBody>
+      </p:sp>
     </p:spTree>
     <p:extLst>
       <p:ext uri="{BB962C8B-B14F-4D97-AF65-F5344CB8AC3E}">
@@ -6484,7 +7709,7 @@
           <p:cNvPr id="2" name="Title 1">
             <a:extLst>
               <a:ext uri="{FF2B5EF4-FFF2-40B4-BE49-F238E27FC236}">
-                <a16:creationId xmlns:a16="http://schemas.microsoft.com/office/drawing/2014/main" id="{37302652-F2C3-6F4B-9499-8F6C8C5EF905}"/>
+                <a16:creationId xmlns:a16="http://schemas.microsoft.com/office/drawing/2014/main" id="{B2A680D1-EEC2-AB4D-9596-82AC473A04EA}"/>
               </a:ext>
             </a:extLst>
           </p:cNvPr>
@@ -6503,7 +7728,7 @@
             <a:pPr algn="ctr"/>
             <a:r>
               <a:rPr lang="en-US" dirty="0"/>
-              <a:t>model building</a:t>
+              <a:t>EDA</a:t>
             </a:r>
           </a:p>
         </p:txBody>
@@ -6513,7 +7738,7 @@
           <p:cNvPr id="3" name="Content Placeholder 2">
             <a:extLst>
               <a:ext uri="{FF2B5EF4-FFF2-40B4-BE49-F238E27FC236}">
-                <a16:creationId xmlns:a16="http://schemas.microsoft.com/office/drawing/2014/main" id="{5A60E3DC-0948-6444-9722-7171146B48F8}"/>
+                <a16:creationId xmlns:a16="http://schemas.microsoft.com/office/drawing/2014/main" id="{C689191D-396B-F240-AF43-22C65C25EDD6}"/>
               </a:ext>
             </a:extLst>
           </p:cNvPr>
@@ -6524,51 +7749,50 @@
             <p:ph idx="1"/>
           </p:nvPr>
         </p:nvSpPr>
-        <p:spPr/>
+        <p:spPr>
+          <a:xfrm>
+            <a:off x="685801" y="2142067"/>
+            <a:ext cx="10624929" cy="4030133"/>
+          </a:xfrm>
+        </p:spPr>
         <p:txBody>
           <a:bodyPr>
-            <a:normAutofit/>
+            <a:noAutofit/>
           </a:bodyPr>
           <a:lstStyle/>
           <a:p>
             <a:r>
-              <a:rPr lang="en-US" sz="2400" dirty="0"/>
-              <a:t>Since target variable is a Categorical variable with 8 classes, it is a classification problem.</a:t>
-            </a:r>
-          </a:p>
-          <a:p>
-            <a:r>
-              <a:rPr lang="en-US" sz="2400" dirty="0"/>
-              <a:t>ML algorithms used for model building are:</a:t>
-            </a:r>
-          </a:p>
-          <a:p>
-            <a:pPr lvl="1"/>
-            <a:r>
-              <a:rPr lang="en-US" sz="2400" dirty="0"/>
-              <a:t>Logistic Regression</a:t>
-            </a:r>
-          </a:p>
-          <a:p>
-            <a:pPr lvl="1"/>
-            <a:r>
-              <a:rPr lang="en-US" sz="2400" dirty="0"/>
-              <a:t>Decision Tree</a:t>
-            </a:r>
-          </a:p>
-          <a:p>
-            <a:pPr lvl="1"/>
-            <a:r>
-              <a:rPr lang="en-US" sz="2400" dirty="0"/>
-              <a:t>Random Forest</a:t>
-            </a:r>
+              <a:rPr lang="en-IN" sz="2400" dirty="0"/>
+              <a:t>Response value was higher for lower insured age and it decreased with age. This indicates that the people with lower age were preferred compared to old people.</a:t>
+            </a:r>
+          </a:p>
+          <a:p>
+            <a:r>
+              <a:rPr lang="en-IN" sz="2400" dirty="0"/>
+              <a:t>Insured Age seems to be tending to a normal distribution with insurance age between 20 – 60 being max.</a:t>
+            </a:r>
+          </a:p>
+          <a:p>
+            <a:r>
+              <a:rPr lang="en-IN" sz="2400" dirty="0"/>
+              <a:t>Also, people with less (not low) weight have higher response level. Same goes for BMI.</a:t>
+            </a:r>
+          </a:p>
+          <a:p>
+            <a:r>
+              <a:rPr lang="en-IN" sz="2400" dirty="0"/>
+              <a:t>This gives us an indication that they prefer healthy people to provide the insurance.</a:t>
+            </a:r>
+          </a:p>
+          <a:p>
+            <a:endParaRPr lang="en-US" sz="2400" dirty="0"/>
           </a:p>
         </p:txBody>
       </p:sp>
     </p:spTree>
     <p:extLst>
       <p:ext uri="{BB962C8B-B14F-4D97-AF65-F5344CB8AC3E}">
-        <p14:creationId xmlns:p14="http://schemas.microsoft.com/office/powerpoint/2010/main" val="2235200997"/>
+        <p14:creationId xmlns:p14="http://schemas.microsoft.com/office/powerpoint/2010/main" val="1357344576"/>
       </p:ext>
     </p:extLst>
   </p:cSld>
@@ -6600,7 +7824,7 @@
           <p:cNvPr id="2" name="Title 1">
             <a:extLst>
               <a:ext uri="{FF2B5EF4-FFF2-40B4-BE49-F238E27FC236}">
-                <a16:creationId xmlns:a16="http://schemas.microsoft.com/office/drawing/2014/main" id="{E77DC439-408C-644B-90D5-D186A6F5C033}"/>
+                <a16:creationId xmlns:a16="http://schemas.microsoft.com/office/drawing/2014/main" id="{37302652-F2C3-6F4B-9499-8F6C8C5EF905}"/>
               </a:ext>
             </a:extLst>
           </p:cNvPr>
@@ -6619,7 +7843,7 @@
             <a:pPr algn="ctr"/>
             <a:r>
               <a:rPr lang="en-US" dirty="0"/>
-              <a:t>Model evaluation</a:t>
+              <a:t>model building</a:t>
             </a:r>
           </a:p>
         </p:txBody>
@@ -6629,7 +7853,7 @@
           <p:cNvPr id="3" name="Content Placeholder 2">
             <a:extLst>
               <a:ext uri="{FF2B5EF4-FFF2-40B4-BE49-F238E27FC236}">
-                <a16:creationId xmlns:a16="http://schemas.microsoft.com/office/drawing/2014/main" id="{C2276BD5-47F1-2D40-A0BF-87D87ED348CB}"/>
+                <a16:creationId xmlns:a16="http://schemas.microsoft.com/office/drawing/2014/main" id="{5A60E3DC-0948-6444-9722-7171146B48F8}"/>
               </a:ext>
             </a:extLst>
           </p:cNvPr>
@@ -6649,62 +7873,42 @@
           <a:p>
             <a:r>
               <a:rPr lang="en-US" sz="2400" dirty="0"/>
-              <a:t>For a classification problem, we will evaluate the models based on:</a:t>
+              <a:t>Since target variable is a Categorical variable with 8 classes, it is a multi class classification problem.</a:t>
+            </a:r>
+          </a:p>
+          <a:p>
+            <a:r>
+              <a:rPr lang="en-US" sz="2400" dirty="0"/>
+              <a:t>ML algorithms used for model building are:</a:t>
             </a:r>
           </a:p>
           <a:p>
             <a:pPr lvl="1"/>
             <a:r>
               <a:rPr lang="en-US" sz="2400" dirty="0"/>
-              <a:t>Confusion Matrix</a:t>
+              <a:t>Logistic Regression</a:t>
             </a:r>
           </a:p>
           <a:p>
             <a:pPr lvl="1"/>
             <a:r>
               <a:rPr lang="en-US" sz="2400" dirty="0"/>
-              <a:t>Accuracy Score</a:t>
+              <a:t>Decision Tree</a:t>
             </a:r>
           </a:p>
           <a:p>
             <a:pPr lvl="1"/>
             <a:r>
               <a:rPr lang="en-US" sz="2400" dirty="0"/>
-              <a:t>Precision</a:t>
-            </a:r>
-          </a:p>
-          <a:p>
-            <a:pPr lvl="1"/>
-            <a:r>
-              <a:rPr lang="en-US" sz="2400" dirty="0"/>
-              <a:t>Sensitivity</a:t>
-            </a:r>
-          </a:p>
-          <a:p>
-            <a:pPr lvl="1"/>
-            <a:r>
-              <a:rPr lang="en-US" sz="2400" dirty="0"/>
-              <a:t>F1 score</a:t>
-            </a:r>
-          </a:p>
-          <a:p>
-            <a:pPr lvl="1"/>
-            <a:r>
-              <a:rPr lang="en-US" sz="2400" dirty="0"/>
-              <a:t>ROC_AUC</a:t>
-            </a:r>
-            <a:r>
-              <a:rPr lang="en-US" sz="2400" i="1" dirty="0"/>
-              <a:t> Curve</a:t>
-            </a:r>
-            <a:endParaRPr lang="en-US" sz="2400" dirty="0"/>
+              <a:t>Random Forest</a:t>
+            </a:r>
           </a:p>
         </p:txBody>
       </p:sp>
     </p:spTree>
     <p:extLst>
       <p:ext uri="{BB962C8B-B14F-4D97-AF65-F5344CB8AC3E}">
-        <p14:creationId xmlns:p14="http://schemas.microsoft.com/office/powerpoint/2010/main" val="2788663293"/>
+        <p14:creationId xmlns:p14="http://schemas.microsoft.com/office/powerpoint/2010/main" val="2235200997"/>
       </p:ext>
     </p:extLst>
   </p:cSld>

</xml_diff>